<commit_message>
change name update stage
</commit_message>
<xml_diff>
--- a/Outlaw/Standards Gives Me a Bad Feeling.pptx
+++ b/Outlaw/Standards Gives Me a Bad Feeling.pptx
@@ -335,7 +335,7 @@
               <a:pPr>
                 <a:defRPr/>
               </a:pPr>
-              <a:t>30.09.2019</a:t>
+              <a:t>04.10.2019</a:t>
             </a:fld>
             <a:endParaRPr lang="en-US"/>
           </a:p>
@@ -4232,7 +4232,7 @@
           <p:nvPr>
             <p:extLst>
               <p:ext uri="{D42A27DB-BD31-4B8C-83A1-F6EECF244321}">
-                <p14:modId xmlns:p14="http://schemas.microsoft.com/office/powerpoint/2010/main" val="3127448598"/>
+                <p14:modId xmlns:p14="http://schemas.microsoft.com/office/powerpoint/2010/main" val="2464288132"/>
               </p:ext>
             </p:extLst>
           </p:nvPr>
@@ -4884,7 +4884,7 @@
                           <a:ea typeface="ＭＳ Ｐゴシック" pitchFamily="-112" charset="-128"/>
                           <a:cs typeface="Times New Roman" pitchFamily="-112" charset="0"/>
                         </a:rPr>
-                        <a:t>SCORING:                Unlimited</a:t>
+                        <a:t>SCORING:                Limited</a:t>
                       </a:r>
                     </a:p>
                     <a:p>
@@ -4918,7 +4918,7 @@
                           <a:ea typeface="ＭＳ Ｐゴシック" pitchFamily="-112" charset="-128"/>
                           <a:cs typeface="Times New Roman" pitchFamily="-112" charset="0"/>
                         </a:rPr>
-                        <a:t>SCORED HITS:        Best 5</a:t>
+                        <a:t>SCORED HITS:        5</a:t>
                       </a:r>
                     </a:p>
                     <a:p>
@@ -5017,22 +5017,7 @@
                           <a:ea typeface="ＭＳ Ｐゴシック" pitchFamily="-112" charset="-128"/>
                           <a:cs typeface="Times New Roman" pitchFamily="-112" charset="0"/>
                         </a:rPr>
-                        <a:t>START-STOP:          Audible - </a:t>
-                      </a:r>
-                      <a:r>
-                        <a:rPr kumimoji="0" lang="en-US" sz="1100" b="1" i="0" u="none" strike="noStrike" cap="none" normalizeH="0" baseline="0">
-                          <a:ln>
-                            <a:noFill/>
-                          </a:ln>
-                          <a:solidFill>
-                            <a:schemeClr val="tx1"/>
-                          </a:solidFill>
-                          <a:effectLst/>
-                          <a:latin typeface="Arial" charset="0"/>
-                          <a:ea typeface="ＭＳ Ｐゴシック" pitchFamily="-112" charset="-128"/>
-                          <a:cs typeface="Times New Roman" pitchFamily="-112" charset="0"/>
-                        </a:rPr>
-                        <a:t>Last shot</a:t>
+                        <a:t>START-STOP:          Audible - Last shot</a:t>
                       </a:r>
                     </a:p>
                     <a:p>
@@ -5053,21 +5038,6 @@
                         <a:tabLst/>
                       </a:pPr>
                       <a:r>
-                        <a:rPr kumimoji="0" lang="en-US" sz="1100" b="1" i="0" u="none" strike="noStrike" cap="none" normalizeH="0" baseline="0">
-                          <a:ln>
-                            <a:noFill/>
-                          </a:ln>
-                          <a:solidFill>
-                            <a:schemeClr val="tx1"/>
-                          </a:solidFill>
-                          <a:effectLst/>
-                          <a:latin typeface="Arial" charset="0"/>
-                          <a:ea typeface="ＭＳ Ｐゴシック" pitchFamily="-112" charset="-128"/>
-                          <a:cs typeface="Times New Roman" pitchFamily="-112" charset="0"/>
-                        </a:rPr>
-                        <a:t>Muzzle </a:t>
-                      </a:r>
-                      <a:r>
                         <a:rPr kumimoji="0" lang="en-US" sz="1100" b="1" i="0" u="none" strike="noStrike" cap="none" normalizeH="0" baseline="0" dirty="0">
                           <a:ln>
                             <a:noFill/>
@@ -5080,7 +5050,7 @@
                           <a:ea typeface="ＭＳ Ｐゴシック" pitchFamily="-112" charset="-128"/>
                           <a:cs typeface="Times New Roman" pitchFamily="-112" charset="0"/>
                         </a:rPr>
-                        <a:t>Safe Points: 180 degree rule</a:t>
+                        <a:t>Muzzle Safe Points: 180 degree rule</a:t>
                       </a:r>
                     </a:p>
                   </a:txBody>
@@ -5198,7 +5168,7 @@
                           <a:ea typeface="ＭＳ Ｐゴシック" pitchFamily="-112" charset="-128"/>
                           <a:cs typeface="Times New Roman" pitchFamily="-112" charset="0"/>
                         </a:rPr>
-                        <a:t>At the start signal, engage T1-T5 from each box with at least one shot.</a:t>
+                        <a:t>At the start signal, engage T1-T5 from each box with only one shot..</a:t>
                       </a:r>
                     </a:p>
                     <a:p>

</xml_diff>